<commit_message>
Added Week 2 materials
</commit_message>
<xml_diff>
--- a/week_2_system_dynamics_crashcourse.pptx
+++ b/week_2_system_dynamics_crashcourse.pptx
@@ -6586,73 +6586,79 @@
               <a:buNone/>
             </a:pPr>
             <a:r>
-              <a:rPr lang="en-US" sz="2000" dirty="0"/>
+              <a:rPr lang="en-US" sz="1800" dirty="0"/>
               <a:t>      -step1 : (+) green arrows show that </a:t>
             </a:r>
             <a:r>
-              <a:rPr lang="en-US" sz="2000" i="1" dirty="0"/>
+              <a:rPr lang="en-US" sz="1800" i="1" dirty="0"/>
               <a:t>Adoption rate</a:t>
             </a:r>
             <a:r>
-              <a:rPr lang="en-US" sz="2000" dirty="0"/>
+              <a:rPr lang="en-US" sz="1800" dirty="0"/>
               <a:t> is function of </a:t>
             </a:r>
             <a:r>
-              <a:rPr lang="en-US" sz="2000" i="1" dirty="0"/>
+              <a:rPr lang="en-US" sz="1800" i="1" dirty="0"/>
               <a:t>Potential Adopters</a:t>
             </a:r>
             <a:r>
-              <a:rPr lang="en-US" sz="2000" dirty="0"/>
+              <a:rPr lang="en-US" sz="1800" dirty="0"/>
               <a:t> and </a:t>
             </a:r>
             <a:r>
-              <a:rPr lang="en-US" sz="2000" i="1" dirty="0"/>
+              <a:rPr lang="en-US" sz="1800" i="1" dirty="0"/>
               <a:t>Adopters</a:t>
             </a:r>
-            <a:endParaRPr lang="en-US" sz="2000" dirty="0"/>
+            <a:endParaRPr lang="en-US" sz="1800" dirty="0"/>
           </a:p>
           <a:p>
             <a:pPr>
               <a:buNone/>
             </a:pPr>
             <a:r>
-              <a:rPr lang="en-US" sz="2000" dirty="0"/>
+              <a:rPr lang="en-US" sz="1800" dirty="0"/>
               <a:t>      -step2 : (-) red arrow shows that </a:t>
             </a:r>
             <a:r>
-              <a:rPr lang="en-US" sz="2000" i="1" dirty="0"/>
+              <a:rPr lang="en-US" sz="1800" i="1" dirty="0"/>
               <a:t>Potential adopters</a:t>
             </a:r>
             <a:r>
-              <a:rPr lang="en-US" sz="2000" dirty="0"/>
+              <a:rPr lang="en-US" sz="1800" dirty="0"/>
               <a:t> decreases by </a:t>
             </a:r>
             <a:r>
-              <a:rPr lang="en-US" sz="2000" i="1" dirty="0"/>
+              <a:rPr lang="en-US" sz="1800" i="1" dirty="0"/>
               <a:t>Adoption rate</a:t>
             </a:r>
-            <a:endParaRPr lang="en-US" sz="2000" dirty="0"/>
+            <a:endParaRPr lang="en-US" sz="1800" dirty="0"/>
           </a:p>
           <a:p>
             <a:pPr>
               <a:buNone/>
             </a:pPr>
             <a:r>
-              <a:rPr lang="en-US" sz="2000" dirty="0"/>
+              <a:rPr lang="en-US" sz="1800" dirty="0"/>
               <a:t>       -step3 : (+) blue arrow shows that </a:t>
             </a:r>
             <a:r>
-              <a:rPr lang="en-US" sz="2000" i="1" dirty="0"/>
+              <a:rPr lang="en-US" sz="1800" i="1" dirty="0"/>
               <a:t>Adopters</a:t>
             </a:r>
             <a:r>
-              <a:rPr lang="en-US" sz="2000" dirty="0"/>
+              <a:rPr lang="en-US" sz="1800" dirty="0"/>
               <a:t> increases by </a:t>
             </a:r>
             <a:r>
-              <a:rPr lang="en-US" sz="2000" i="1" dirty="0"/>
+              <a:rPr lang="en-US" sz="1800" i="1" dirty="0"/>
               <a:t>Adoption rate</a:t>
             </a:r>
+          </a:p>
+          <a:p>
+            <a:pPr>
+              <a:buNone/>
+            </a:pPr>
+            <a:endParaRPr lang="en-US" sz="2000" i="1" dirty="0"/>
           </a:p>
           <a:p>
             <a:pPr>
@@ -6750,7 +6756,7 @@
         </p:blipFill>
         <p:spPr bwMode="auto">
           <a:xfrm>
-            <a:off x="2000250" y="3710781"/>
+            <a:off x="2000250" y="3611563"/>
             <a:ext cx="5143500" cy="2514600"/>
           </a:xfrm>
           <a:prstGeom prst="rect">

</xml_diff>